<commit_message>
Added additional exercise for bi-implication
</commit_message>
<xml_diff>
--- a/08_Bi_implication/Biimplication.pptx
+++ b/08_Bi_implication/Biimplication.pptx
@@ -5,7 +5,7 @@
     <p:sldMasterId id="2147483648" r:id="rId1"/>
   </p:sldMasterIdLst>
   <p:notesMasterIdLst>
-    <p:notesMasterId r:id="rId10"/>
+    <p:notesMasterId r:id="rId11"/>
   </p:notesMasterIdLst>
   <p:sldIdLst>
     <p:sldId id="258" r:id="rId2"/>
@@ -15,7 +15,8 @@
     <p:sldId id="359" r:id="rId6"/>
     <p:sldId id="360" r:id="rId7"/>
     <p:sldId id="361" r:id="rId8"/>
-    <p:sldId id="261" r:id="rId9"/>
+    <p:sldId id="362" r:id="rId9"/>
+    <p:sldId id="261" r:id="rId10"/>
   </p:sldIdLst>
   <p:sldSz cx="12192000" cy="6858000"/>
   <p:notesSz cx="6858000" cy="9144000"/>
@@ -4804,6 +4805,345 @@
 <file path=ppt/slides/slide8.xml><?xml version="1.0" encoding="utf-8"?>
 <p:sld xmlns:a="http://schemas.openxmlformats.org/drawingml/2006/main" xmlns:r="http://schemas.openxmlformats.org/officeDocument/2006/relationships" xmlns:p="http://schemas.openxmlformats.org/presentationml/2006/main">
   <p:cSld>
+    <p:spTree>
+      <p:nvGrpSpPr>
+        <p:cNvPr id="1" name=""/>
+        <p:cNvGrpSpPr/>
+        <p:nvPr/>
+      </p:nvGrpSpPr>
+      <p:grpSpPr>
+        <a:xfrm>
+          <a:off x="0" y="0"/>
+          <a:ext cx="0" cy="0"/>
+          <a:chOff x="0" y="0"/>
+          <a:chExt cx="0" cy="0"/>
+        </a:xfrm>
+      </p:grpSpPr>
+      <p:sp>
+        <p:nvSpPr>
+          <p:cNvPr id="2" name="Title 1">
+            <a:extLst>
+              <a:ext uri="{FF2B5EF4-FFF2-40B4-BE49-F238E27FC236}">
+                <a16:creationId xmlns:a16="http://schemas.microsoft.com/office/drawing/2014/main" id="{CC7A68E5-D26C-D843-863D-04054B039062}"/>
+              </a:ext>
+            </a:extLst>
+          </p:cNvPr>
+          <p:cNvSpPr>
+            <a:spLocks noGrp="1"/>
+          </p:cNvSpPr>
+          <p:nvPr>
+            <p:ph type="title"/>
+          </p:nvPr>
+        </p:nvSpPr>
+        <p:spPr/>
+        <p:txBody>
+          <a:bodyPr/>
+          <a:lstStyle/>
+          <a:p>
+            <a:r>
+              <a:rPr lang="en-US" dirty="0"/>
+              <a:t>Exercise</a:t>
+            </a:r>
+          </a:p>
+        </p:txBody>
+      </p:sp>
+      <p:sp>
+        <p:nvSpPr>
+          <p:cNvPr id="3" name="Content Placeholder 2">
+            <a:extLst>
+              <a:ext uri="{FF2B5EF4-FFF2-40B4-BE49-F238E27FC236}">
+                <a16:creationId xmlns:a16="http://schemas.microsoft.com/office/drawing/2014/main" id="{9442A99F-44F0-A44E-82A6-82FE64613B19}"/>
+              </a:ext>
+            </a:extLst>
+          </p:cNvPr>
+          <p:cNvSpPr>
+            <a:spLocks noGrp="1"/>
+          </p:cNvSpPr>
+          <p:nvPr>
+            <p:ph idx="1"/>
+          </p:nvPr>
+        </p:nvSpPr>
+        <p:spPr/>
+        <p:txBody>
+          <a:bodyPr>
+            <a:normAutofit lnSpcReduction="10000"/>
+          </a:bodyPr>
+          <a:lstStyle/>
+          <a:p>
+            <a:r>
+              <a:rPr lang="en-US" dirty="0"/>
+              <a:t>Construct a proof, </a:t>
+            </a:r>
+            <a:r>
+              <a:rPr lang="en-US" dirty="0" err="1"/>
+              <a:t>a_imp_b_imp_c_iff_a_and_b_imp_c</a:t>
+            </a:r>
+            <a:r>
+              <a:rPr lang="en-US" dirty="0"/>
+              <a:t>, that A → B → C ↔ A ∧ B → C.</a:t>
+            </a:r>
+          </a:p>
+          <a:p>
+            <a:pPr marL="0" indent="0">
+              <a:buNone/>
+            </a:pPr>
+            <a:r>
+              <a:rPr lang="en-US" sz="2400" dirty="0">
+                <a:latin typeface="Courier New" panose="02070309020205020404" pitchFamily="49" charset="0"/>
+                <a:cs typeface="Courier New" panose="02070309020205020404" pitchFamily="49" charset="0"/>
+              </a:rPr>
+              <a:t>lemma </a:t>
+            </a:r>
+            <a:r>
+              <a:rPr lang="en-US" sz="2400" dirty="0" err="1">
+                <a:latin typeface="Courier New" panose="02070309020205020404" pitchFamily="49" charset="0"/>
+                <a:cs typeface="Courier New" panose="02070309020205020404" pitchFamily="49" charset="0"/>
+              </a:rPr>
+              <a:t>a_imp_b_imp_c_iff_a_and_b_imp_c</a:t>
+            </a:r>
+            <a:r>
+              <a:rPr lang="en-US" sz="2400" dirty="0">
+                <a:latin typeface="Courier New" panose="02070309020205020404" pitchFamily="49" charset="0"/>
+                <a:cs typeface="Courier New" panose="02070309020205020404" pitchFamily="49" charset="0"/>
+              </a:rPr>
+              <a:t>:</a:t>
+            </a:r>
+          </a:p>
+          <a:p>
+            <a:pPr marL="0" indent="0">
+              <a:buNone/>
+            </a:pPr>
+            <a:r>
+              <a:rPr lang="en-US" sz="2400" dirty="0">
+                <a:latin typeface="Courier New" panose="02070309020205020404" pitchFamily="49" charset="0"/>
+                <a:cs typeface="Courier New" panose="02070309020205020404" pitchFamily="49" charset="0"/>
+              </a:rPr>
+              <a:t>  ∀ A B C: Prop</a:t>
+            </a:r>
+            <a:r>
+              <a:rPr lang="en-US" sz="2400">
+                <a:latin typeface="Courier New" panose="02070309020205020404" pitchFamily="49" charset="0"/>
+                <a:cs typeface="Courier New" panose="02070309020205020404" pitchFamily="49" charset="0"/>
+              </a:rPr>
+              <a:t>, ((A → B) → C) ↔ ((A ∧ B) → C) </a:t>
+            </a:r>
+            <a:r>
+              <a:rPr lang="en-US" sz="2400" dirty="0">
+                <a:latin typeface="Courier New" panose="02070309020205020404" pitchFamily="49" charset="0"/>
+                <a:cs typeface="Courier New" panose="02070309020205020404" pitchFamily="49" charset="0"/>
+              </a:rPr>
+              <a:t>:=</a:t>
+            </a:r>
+          </a:p>
+          <a:p>
+            <a:pPr marL="0" indent="0">
+              <a:buNone/>
+            </a:pPr>
+            <a:r>
+              <a:rPr lang="en-US" sz="2400" dirty="0">
+                <a:latin typeface="Courier New" panose="02070309020205020404" pitchFamily="49" charset="0"/>
+                <a:cs typeface="Courier New" panose="02070309020205020404" pitchFamily="49" charset="0"/>
+              </a:rPr>
+              <a:t>  </a:t>
+            </a:r>
+            <a:r>
+              <a:rPr lang="el-GR" sz="2400" dirty="0">
+                <a:latin typeface="Courier New" panose="02070309020205020404" pitchFamily="49" charset="0"/>
+                <a:cs typeface="Courier New" panose="02070309020205020404" pitchFamily="49" charset="0"/>
+              </a:rPr>
+              <a:t>λ </a:t>
+            </a:r>
+            <a:r>
+              <a:rPr lang="en-US" sz="2400" dirty="0">
+                <a:latin typeface="Courier New" panose="02070309020205020404" pitchFamily="49" charset="0"/>
+                <a:cs typeface="Courier New" panose="02070309020205020404" pitchFamily="49" charset="0"/>
+              </a:rPr>
+              <a:t>A B C: Prop,</a:t>
+            </a:r>
+          </a:p>
+          <a:p>
+            <a:pPr marL="0" indent="0">
+              <a:buNone/>
+            </a:pPr>
+            <a:r>
+              <a:rPr lang="en-US" sz="2400" dirty="0">
+                <a:latin typeface="Courier New" panose="02070309020205020404" pitchFamily="49" charset="0"/>
+                <a:cs typeface="Courier New" panose="02070309020205020404" pitchFamily="49" charset="0"/>
+              </a:rPr>
+              <a:t>    begin</a:t>
+            </a:r>
+          </a:p>
+          <a:p>
+            <a:pPr marL="0" indent="0">
+              <a:buNone/>
+            </a:pPr>
+            <a:r>
+              <a:rPr lang="en-US" sz="2400" dirty="0">
+                <a:latin typeface="Courier New" panose="02070309020205020404" pitchFamily="49" charset="0"/>
+                <a:cs typeface="Courier New" panose="02070309020205020404" pitchFamily="49" charset="0"/>
+              </a:rPr>
+              <a:t>      sorry</a:t>
+            </a:r>
+          </a:p>
+          <a:p>
+            <a:pPr marL="0" indent="0">
+              <a:buNone/>
+            </a:pPr>
+            <a:r>
+              <a:rPr lang="en-US" sz="2400" dirty="0">
+                <a:latin typeface="Courier New" panose="02070309020205020404" pitchFamily="49" charset="0"/>
+                <a:cs typeface="Courier New" panose="02070309020205020404" pitchFamily="49" charset="0"/>
+              </a:rPr>
+              <a:t>    end</a:t>
+            </a:r>
+          </a:p>
+          <a:p>
+            <a:pPr marL="0" indent="0">
+              <a:buNone/>
+            </a:pPr>
+            <a:endParaRPr lang="en-US" sz="2400" dirty="0">
+              <a:latin typeface="Courier New" panose="02070309020205020404" pitchFamily="49" charset="0"/>
+              <a:cs typeface="Courier New" panose="02070309020205020404" pitchFamily="49" charset="0"/>
+            </a:endParaRPr>
+          </a:p>
+          <a:p>
+            <a:r>
+              <a:rPr lang="en-US" dirty="0"/>
+              <a:t>Given that you can prove this, does this mean that A → B = A ∧ B?</a:t>
+            </a:r>
+          </a:p>
+          <a:p>
+            <a:endParaRPr lang="en-US" dirty="0"/>
+          </a:p>
+        </p:txBody>
+      </p:sp>
+      <p:sp>
+        <p:nvSpPr>
+          <p:cNvPr id="4" name="Slide Number Placeholder 3">
+            <a:extLst>
+              <a:ext uri="{FF2B5EF4-FFF2-40B4-BE49-F238E27FC236}">
+                <a16:creationId xmlns:a16="http://schemas.microsoft.com/office/drawing/2014/main" id="{BA21A67C-3821-D246-88D6-DB0BF17381D7}"/>
+              </a:ext>
+            </a:extLst>
+          </p:cNvPr>
+          <p:cNvSpPr>
+            <a:spLocks noGrp="1"/>
+          </p:cNvSpPr>
+          <p:nvPr>
+            <p:ph type="sldNum" sz="quarter" idx="12"/>
+          </p:nvPr>
+        </p:nvSpPr>
+        <p:spPr/>
+        <p:txBody>
+          <a:bodyPr/>
+          <a:lstStyle/>
+          <a:p>
+            <a:fld id="{3352CBF5-17B8-4387-88A6-ABF9F8C64D5A}" type="slidenum">
+              <a:rPr lang="en-US" smtClean="0"/>
+              <a:t>8</a:t>
+            </a:fld>
+            <a:endParaRPr lang="en-US"/>
+          </a:p>
+        </p:txBody>
+      </p:sp>
+    </p:spTree>
+    <p:extLst>
+      <p:ext uri="{BB962C8B-B14F-4D97-AF65-F5344CB8AC3E}">
+        <p14:creationId xmlns:p14="http://schemas.microsoft.com/office/powerpoint/2010/main" val="1079744920"/>
+      </p:ext>
+    </p:extLst>
+  </p:cSld>
+  <p:clrMapOvr>
+    <a:masterClrMapping/>
+  </p:clrMapOvr>
+  <p:timing>
+    <p:tnLst>
+      <p:par>
+        <p:cTn id="1" dur="indefinite" restart="never" nodeType="tmRoot">
+          <p:childTnLst>
+            <p:seq concurrent="1" nextAc="seek">
+              <p:cTn id="2" dur="indefinite" nodeType="mainSeq">
+                <p:childTnLst>
+                  <p:par>
+                    <p:cTn id="3" fill="hold">
+                      <p:stCondLst>
+                        <p:cond delay="indefinite"/>
+                      </p:stCondLst>
+                      <p:childTnLst>
+                        <p:par>
+                          <p:cTn id="4" fill="hold">
+                            <p:stCondLst>
+                              <p:cond delay="0"/>
+                            </p:stCondLst>
+                            <p:childTnLst>
+                              <p:par>
+                                <p:cTn id="5" presetID="1" presetClass="entr" presetSubtype="0" fill="hold" grpId="0" nodeType="clickEffect">
+                                  <p:stCondLst>
+                                    <p:cond delay="0"/>
+                                  </p:stCondLst>
+                                  <p:childTnLst>
+                                    <p:set>
+                                      <p:cBhvr>
+                                        <p:cTn id="6" dur="1" fill="hold">
+                                          <p:stCondLst>
+                                            <p:cond delay="0"/>
+                                          </p:stCondLst>
+                                        </p:cTn>
+                                        <p:tgtEl>
+                                          <p:spTgt spid="3">
+                                            <p:txEl>
+                                              <p:pRg st="8" end="8"/>
+                                            </p:txEl>
+                                          </p:spTgt>
+                                        </p:tgtEl>
+                                        <p:attrNameLst>
+                                          <p:attrName>style.visibility</p:attrName>
+                                        </p:attrNameLst>
+                                      </p:cBhvr>
+                                      <p:to>
+                                        <p:strVal val="visible"/>
+                                      </p:to>
+                                    </p:set>
+                                  </p:childTnLst>
+                                </p:cTn>
+                              </p:par>
+                            </p:childTnLst>
+                          </p:cTn>
+                        </p:par>
+                      </p:childTnLst>
+                    </p:cTn>
+                  </p:par>
+                </p:childTnLst>
+              </p:cTn>
+              <p:prevCondLst>
+                <p:cond evt="onPrev" delay="0">
+                  <p:tgtEl>
+                    <p:sldTgt/>
+                  </p:tgtEl>
+                </p:cond>
+              </p:prevCondLst>
+              <p:nextCondLst>
+                <p:cond evt="onNext" delay="0">
+                  <p:tgtEl>
+                    <p:sldTgt/>
+                  </p:tgtEl>
+                </p:cond>
+              </p:nextCondLst>
+            </p:seq>
+          </p:childTnLst>
+        </p:cTn>
+      </p:par>
+    </p:tnLst>
+    <p:bldLst>
+      <p:bldP spid="3" grpId="0" uiExpand="1" build="p"/>
+    </p:bldLst>
+  </p:timing>
+</p:sld>
+</file>
+
+<file path=ppt/slides/slide9.xml><?xml version="1.0" encoding="utf-8"?>
+<p:sld xmlns:a="http://schemas.openxmlformats.org/drawingml/2006/main" xmlns:r="http://schemas.openxmlformats.org/officeDocument/2006/relationships" xmlns:p="http://schemas.openxmlformats.org/presentationml/2006/main">
+  <p:cSld>
     <p:bg>
       <p:bgPr>
         <a:solidFill>
@@ -5072,7 +5412,7 @@
           <a:p>
             <a:fld id="{3352CBF5-17B8-4387-88A6-ABF9F8C64D5A}" type="slidenum">
               <a:rPr lang="en-US" smtClean="0"/>
-              <a:t>8</a:t>
+              <a:t>9</a:t>
             </a:fld>
             <a:endParaRPr lang="en-US"/>
           </a:p>

</xml_diff>

<commit_message>
Added storytime to Biimplication
</commit_message>
<xml_diff>
--- a/08_Bi_implication/Biimplication.pptx
+++ b/08_Bi_implication/Biimplication.pptx
@@ -5,7 +5,7 @@
     <p:sldMasterId id="2147483648" r:id="rId1"/>
   </p:sldMasterIdLst>
   <p:notesMasterIdLst>
-    <p:notesMasterId r:id="rId11"/>
+    <p:notesMasterId r:id="rId13"/>
   </p:notesMasterIdLst>
   <p:sldIdLst>
     <p:sldId id="258" r:id="rId2"/>
@@ -16,7 +16,9 @@
     <p:sldId id="360" r:id="rId7"/>
     <p:sldId id="361" r:id="rId8"/>
     <p:sldId id="362" r:id="rId9"/>
-    <p:sldId id="261" r:id="rId10"/>
+    <p:sldId id="363" r:id="rId10"/>
+    <p:sldId id="364" r:id="rId11"/>
+    <p:sldId id="261" r:id="rId12"/>
   </p:sldIdLst>
   <p:sldSz cx="12192000" cy="6858000"/>
   <p:notesSz cx="6858000" cy="9144000"/>
@@ -205,7 +207,7 @@
           <a:p>
             <a:fld id="{A5C20BB3-3CCB-4FE5-991B-82F6BCB48AF3}" type="datetimeFigureOut">
               <a:rPr lang="en-US" smtClean="0"/>
-              <a:t>10/8/18</a:t>
+              <a:t>10/10/18</a:t>
             </a:fld>
             <a:endParaRPr lang="en-US"/>
           </a:p>
@@ -601,7 +603,7 @@
           <a:p>
             <a:fld id="{B6C1A396-ADAF-C049-ABC6-C32D7D1CCAD8}" type="datetime1">
               <a:rPr lang="en-US" smtClean="0"/>
-              <a:t>10/8/18</a:t>
+              <a:t>10/10/18</a:t>
             </a:fld>
             <a:endParaRPr lang="en-US"/>
           </a:p>
@@ -769,7 +771,7 @@
           <a:p>
             <a:fld id="{1E275737-3B4B-C743-819D-3D7767301481}" type="datetime1">
               <a:rPr lang="en-US" smtClean="0"/>
-              <a:t>10/8/18</a:t>
+              <a:t>10/10/18</a:t>
             </a:fld>
             <a:endParaRPr lang="en-US"/>
           </a:p>
@@ -947,7 +949,7 @@
           <a:p>
             <a:fld id="{23E60EA0-28A6-2A4C-A0DF-F463B4716CF4}" type="datetime1">
               <a:rPr lang="en-US" smtClean="0"/>
-              <a:t>10/8/18</a:t>
+              <a:t>10/10/18</a:t>
             </a:fld>
             <a:endParaRPr lang="en-US"/>
           </a:p>
@@ -1115,7 +1117,7 @@
           <a:p>
             <a:fld id="{7F4ADCAF-FE79-6D4A-8F0C-FF6B2DC49B87}" type="datetime1">
               <a:rPr lang="en-US" smtClean="0"/>
-              <a:t>10/8/18</a:t>
+              <a:t>10/10/18</a:t>
             </a:fld>
             <a:endParaRPr lang="en-US"/>
           </a:p>
@@ -1360,7 +1362,7 @@
           <a:p>
             <a:fld id="{BB4170EC-B8E8-F84E-B40B-4CA40E87F0F1}" type="datetime1">
               <a:rPr lang="en-US" smtClean="0"/>
-              <a:t>10/8/18</a:t>
+              <a:t>10/10/18</a:t>
             </a:fld>
             <a:endParaRPr lang="en-US"/>
           </a:p>
@@ -1589,7 +1591,7 @@
           <a:p>
             <a:fld id="{3549A180-BBB6-AB44-9EC6-613957D9BC21}" type="datetime1">
               <a:rPr lang="en-US" smtClean="0"/>
-              <a:t>10/8/18</a:t>
+              <a:t>10/10/18</a:t>
             </a:fld>
             <a:endParaRPr lang="en-US"/>
           </a:p>
@@ -1953,7 +1955,7 @@
           <a:p>
             <a:fld id="{A29669B0-2692-6042-A028-87F920E9CE7A}" type="datetime1">
               <a:rPr lang="en-US" smtClean="0"/>
-              <a:t>10/8/18</a:t>
+              <a:t>10/10/18</a:t>
             </a:fld>
             <a:endParaRPr lang="en-US"/>
           </a:p>
@@ -2070,7 +2072,7 @@
           <a:p>
             <a:fld id="{26B5280F-B487-C54A-8A7A-C35A806AF023}" type="datetime1">
               <a:rPr lang="en-US" smtClean="0"/>
-              <a:t>10/8/18</a:t>
+              <a:t>10/10/18</a:t>
             </a:fld>
             <a:endParaRPr lang="en-US"/>
           </a:p>
@@ -2165,7 +2167,7 @@
           <a:p>
             <a:fld id="{FAAE216B-9CF3-A14B-9A92-B9DABF79BFCE}" type="datetime1">
               <a:rPr lang="en-US" smtClean="0"/>
-              <a:t>10/8/18</a:t>
+              <a:t>10/10/18</a:t>
             </a:fld>
             <a:endParaRPr lang="en-US"/>
           </a:p>
@@ -2440,7 +2442,7 @@
           <a:p>
             <a:fld id="{5B8013A5-7B70-2548-B20A-4534B630AB6C}" type="datetime1">
               <a:rPr lang="en-US" smtClean="0"/>
-              <a:t>10/8/18</a:t>
+              <a:t>10/10/18</a:t>
             </a:fld>
             <a:endParaRPr lang="en-US"/>
           </a:p>
@@ -2695,7 +2697,7 @@
           <a:p>
             <a:fld id="{E9928226-EDE2-0A4C-81FC-AFBDD145D237}" type="datetime1">
               <a:rPr lang="en-US" smtClean="0"/>
-              <a:t>10/8/18</a:t>
+              <a:t>10/10/18</a:t>
             </a:fld>
             <a:endParaRPr lang="en-US"/>
           </a:p>
@@ -2906,7 +2908,7 @@
           <a:p>
             <a:fld id="{7D3EA1F3-586E-4B46-9B9A-D49AC241EEC9}" type="datetime1">
               <a:rPr lang="en-US" smtClean="0"/>
-              <a:t>10/8/18</a:t>
+              <a:t>10/10/18</a:t>
             </a:fld>
             <a:endParaRPr lang="en-US"/>
           </a:p>
@@ -3525,6 +3527,509 @@
 </p:sld>
 </file>
 
+<file path=ppt/slides/slide10.xml><?xml version="1.0" encoding="utf-8"?>
+<p:sld xmlns:a="http://schemas.openxmlformats.org/drawingml/2006/main" xmlns:r="http://schemas.openxmlformats.org/officeDocument/2006/relationships" xmlns:p="http://schemas.openxmlformats.org/presentationml/2006/main">
+  <p:cSld>
+    <p:spTree>
+      <p:nvGrpSpPr>
+        <p:cNvPr id="1" name=""/>
+        <p:cNvGrpSpPr/>
+        <p:nvPr/>
+      </p:nvGrpSpPr>
+      <p:grpSpPr>
+        <a:xfrm>
+          <a:off x="0" y="0"/>
+          <a:ext cx="0" cy="0"/>
+          <a:chOff x="0" y="0"/>
+          <a:chExt cx="0" cy="0"/>
+        </a:xfrm>
+      </p:grpSpPr>
+      <p:sp>
+        <p:nvSpPr>
+          <p:cNvPr id="2" name="Title 1">
+            <a:extLst>
+              <a:ext uri="{FF2B5EF4-FFF2-40B4-BE49-F238E27FC236}">
+                <a16:creationId xmlns:a16="http://schemas.microsoft.com/office/drawing/2014/main" id="{706532B7-F9A5-D34D-8E77-7B53AAF1CF80}"/>
+              </a:ext>
+            </a:extLst>
+          </p:cNvPr>
+          <p:cNvSpPr>
+            <a:spLocks noGrp="1"/>
+          </p:cNvSpPr>
+          <p:nvPr>
+            <p:ph type="title"/>
+          </p:nvPr>
+        </p:nvSpPr>
+        <p:spPr/>
+        <p:txBody>
+          <a:bodyPr/>
+          <a:lstStyle/>
+          <a:p>
+            <a:r>
+              <a:rPr lang="en-US" dirty="0"/>
+              <a:t>Storytime… (2)</a:t>
+            </a:r>
+          </a:p>
+        </p:txBody>
+      </p:sp>
+      <p:sp>
+        <p:nvSpPr>
+          <p:cNvPr id="3" name="Content Placeholder 2">
+            <a:extLst>
+              <a:ext uri="{FF2B5EF4-FFF2-40B4-BE49-F238E27FC236}">
+                <a16:creationId xmlns:a16="http://schemas.microsoft.com/office/drawing/2014/main" id="{D3704A8B-0126-594F-828F-1063E267F3B7}"/>
+              </a:ext>
+            </a:extLst>
+          </p:cNvPr>
+          <p:cNvSpPr>
+            <a:spLocks noGrp="1"/>
+          </p:cNvSpPr>
+          <p:nvPr>
+            <p:ph idx="1"/>
+          </p:nvPr>
+        </p:nvSpPr>
+        <p:spPr/>
+        <p:txBody>
+          <a:bodyPr/>
+          <a:lstStyle/>
+          <a:p>
+            <a:pPr marL="0" indent="0">
+              <a:buNone/>
+            </a:pPr>
+            <a:r>
+              <a:rPr lang="en-US" dirty="0"/>
+              <a:t>  </a:t>
+            </a:r>
+            <a:r>
+              <a:rPr lang="en-US" dirty="0" err="1"/>
+              <a:t>are_segments_intersecting_alt</a:t>
+            </a:r>
+            <a:r>
+              <a:rPr lang="en-US" dirty="0"/>
+              <a:t>?(s1, s2: segment_2d): bool =</a:t>
+            </a:r>
+          </a:p>
+          <a:p>
+            <a:pPr marL="0" indent="0">
+              <a:buNone/>
+            </a:pPr>
+            <a:r>
+              <a:rPr lang="en-US" dirty="0"/>
+              <a:t>    EXISTS(p1: (is_point_on_segment?(s1))):</a:t>
+            </a:r>
+          </a:p>
+          <a:p>
+            <a:pPr marL="0" indent="0">
+              <a:buNone/>
+            </a:pPr>
+            <a:r>
+              <a:rPr lang="en-US" dirty="0"/>
+              <a:t>      is_point_on_segment?(s2)(p1);</a:t>
+            </a:r>
+          </a:p>
+          <a:p>
+            <a:pPr marL="0" indent="0">
+              <a:buNone/>
+            </a:pPr>
+            <a:endParaRPr lang="en-US" dirty="0"/>
+          </a:p>
+          <a:p>
+            <a:pPr marL="0" indent="0">
+              <a:buNone/>
+            </a:pPr>
+            <a:r>
+              <a:rPr lang="en-US" dirty="0"/>
+              <a:t>  are_segments_intersecting?_</a:t>
+            </a:r>
+            <a:r>
+              <a:rPr lang="en-US" dirty="0" err="1"/>
+              <a:t>defs_same</a:t>
+            </a:r>
+            <a:r>
+              <a:rPr lang="en-US" dirty="0"/>
+              <a:t>: LEMMA</a:t>
+            </a:r>
+          </a:p>
+          <a:p>
+            <a:pPr marL="0" indent="0">
+              <a:buNone/>
+            </a:pPr>
+            <a:r>
+              <a:rPr lang="en-US" dirty="0"/>
+              <a:t>    FORALL(s1, s2: segment_2d):</a:t>
+            </a:r>
+          </a:p>
+          <a:p>
+            <a:pPr marL="0" indent="0">
+              <a:buNone/>
+            </a:pPr>
+            <a:r>
+              <a:rPr lang="en-US" dirty="0"/>
+              <a:t>      are_segments_intersecting?(s1)(s2) </a:t>
+            </a:r>
+            <a:r>
+              <a:rPr lang="en-US" dirty="0" err="1"/>
+              <a:t>iff</a:t>
+            </a:r>
+            <a:endParaRPr lang="en-US" dirty="0"/>
+          </a:p>
+          <a:p>
+            <a:pPr marL="0" indent="0">
+              <a:buNone/>
+            </a:pPr>
+            <a:r>
+              <a:rPr lang="en-US" dirty="0"/>
+              <a:t>      </a:t>
+            </a:r>
+            <a:r>
+              <a:rPr lang="en-US" dirty="0" err="1"/>
+              <a:t>are_segments_intersecting_alt</a:t>
+            </a:r>
+            <a:r>
+              <a:rPr lang="en-US" dirty="0"/>
+              <a:t>?(s1, s2);</a:t>
+            </a:r>
+          </a:p>
+          <a:p>
+            <a:pPr marL="0" indent="0">
+              <a:buNone/>
+            </a:pPr>
+            <a:endParaRPr lang="en-US" dirty="0"/>
+          </a:p>
+        </p:txBody>
+      </p:sp>
+      <p:sp>
+        <p:nvSpPr>
+          <p:cNvPr id="4" name="Slide Number Placeholder 3">
+            <a:extLst>
+              <a:ext uri="{FF2B5EF4-FFF2-40B4-BE49-F238E27FC236}">
+                <a16:creationId xmlns:a16="http://schemas.microsoft.com/office/drawing/2014/main" id="{5C02EC81-AED8-5540-BE79-31BBF43F2E31}"/>
+              </a:ext>
+            </a:extLst>
+          </p:cNvPr>
+          <p:cNvSpPr>
+            <a:spLocks noGrp="1"/>
+          </p:cNvSpPr>
+          <p:nvPr>
+            <p:ph type="sldNum" sz="quarter" idx="12"/>
+          </p:nvPr>
+        </p:nvSpPr>
+        <p:spPr/>
+        <p:txBody>
+          <a:bodyPr/>
+          <a:lstStyle/>
+          <a:p>
+            <a:fld id="{3352CBF5-17B8-4387-88A6-ABF9F8C64D5A}" type="slidenum">
+              <a:rPr lang="en-US" smtClean="0"/>
+              <a:t>10</a:t>
+            </a:fld>
+            <a:endParaRPr lang="en-US"/>
+          </a:p>
+        </p:txBody>
+      </p:sp>
+    </p:spTree>
+    <p:extLst>
+      <p:ext uri="{BB962C8B-B14F-4D97-AF65-F5344CB8AC3E}">
+        <p14:creationId xmlns:p14="http://schemas.microsoft.com/office/powerpoint/2010/main" val="4037767032"/>
+      </p:ext>
+    </p:extLst>
+  </p:cSld>
+  <p:clrMapOvr>
+    <a:masterClrMapping/>
+  </p:clrMapOvr>
+</p:sld>
+</file>
+
+<file path=ppt/slides/slide11.xml><?xml version="1.0" encoding="utf-8"?>
+<p:sld xmlns:a="http://schemas.openxmlformats.org/drawingml/2006/main" xmlns:r="http://schemas.openxmlformats.org/officeDocument/2006/relationships" xmlns:p="http://schemas.openxmlformats.org/presentationml/2006/main">
+  <p:cSld>
+    <p:bg>
+      <p:bgPr>
+        <a:solidFill>
+          <a:schemeClr val="bg1"/>
+        </a:solidFill>
+        <a:effectLst/>
+      </p:bgPr>
+    </p:bg>
+    <p:spTree>
+      <p:nvGrpSpPr>
+        <p:cNvPr id="1" name=""/>
+        <p:cNvGrpSpPr/>
+        <p:nvPr/>
+      </p:nvGrpSpPr>
+      <p:grpSpPr>
+        <a:xfrm>
+          <a:off x="0" y="0"/>
+          <a:ext cx="0" cy="0"/>
+          <a:chOff x="0" y="0"/>
+          <a:chExt cx="0" cy="0"/>
+        </a:xfrm>
+      </p:grpSpPr>
+      <p:sp useBgFill="1">
+        <p:nvSpPr>
+          <p:cNvPr id="9" name="Rectangle 8">
+            <a:extLst>
+              <a:ext uri="{FF2B5EF4-FFF2-40B4-BE49-F238E27FC236}">
+                <a16:creationId xmlns:a16="http://schemas.microsoft.com/office/drawing/2014/main" id="{3B854194-185D-494D-905C-7C7CB2E30F6E}"/>
+              </a:ext>
+              <a:ext uri="{C183D7F6-B498-43B3-948B-1728B52AA6E4}">
+                <adec:decorative xmlns:adec="http://schemas.microsoft.com/office/drawing/2017/decorative" val="1"/>
+              </a:ext>
+            </a:extLst>
+          </p:cNvPr>
+          <p:cNvSpPr>
+            <a:spLocks noGrp="1" noRot="1" noChangeAspect="1" noMove="1" noResize="1" noEditPoints="1" noAdjustHandles="1" noChangeArrowheads="1" noChangeShapeType="1" noTextEdit="1"/>
+          </p:cNvSpPr>
+          <p:nvPr>
+            <p:extLst>
+              <p:ext uri="{386F3935-93C4-4BCD-93E2-E3B085C9AB24}">
+                <p16:designElem xmlns:p16="http://schemas.microsoft.com/office/powerpoint/2015/main" val="1"/>
+              </p:ext>
+            </p:extLst>
+          </p:nvPr>
+        </p:nvSpPr>
+        <p:spPr>
+          <a:xfrm>
+            <a:off x="1" y="0"/>
+            <a:ext cx="6082110" cy="6858000"/>
+          </a:xfrm>
+          <a:prstGeom prst="rect">
+            <a:avLst/>
+          </a:prstGeom>
+          <a:ln>
+            <a:noFill/>
+          </a:ln>
+        </p:spPr>
+        <p:style>
+          <a:lnRef idx="2">
+            <a:schemeClr val="accent1">
+              <a:shade val="50000"/>
+            </a:schemeClr>
+          </a:lnRef>
+          <a:fillRef idx="1">
+            <a:schemeClr val="accent1"/>
+          </a:fillRef>
+          <a:effectRef idx="0">
+            <a:schemeClr val="accent1"/>
+          </a:effectRef>
+          <a:fontRef idx="minor">
+            <a:schemeClr val="lt1"/>
+          </a:fontRef>
+        </p:style>
+        <p:txBody>
+          <a:bodyPr rtlCol="0" anchor="ctr"/>
+          <a:lstStyle/>
+          <a:p>
+            <a:pPr algn="ctr"/>
+            <a:endParaRPr lang="en-US"/>
+          </a:p>
+        </p:txBody>
+      </p:sp>
+      <p:sp>
+        <p:nvSpPr>
+          <p:cNvPr id="11" name="Rectangle 10">
+            <a:extLst>
+              <a:ext uri="{FF2B5EF4-FFF2-40B4-BE49-F238E27FC236}">
+                <a16:creationId xmlns:a16="http://schemas.microsoft.com/office/drawing/2014/main" id="{B4F5FA0D-0104-4987-8241-EFF7C85B88DE}"/>
+              </a:ext>
+              <a:ext uri="{C183D7F6-B498-43B3-948B-1728B52AA6E4}">
+                <adec:decorative xmlns:adec="http://schemas.microsoft.com/office/drawing/2017/decorative" val="1"/>
+              </a:ext>
+            </a:extLst>
+          </p:cNvPr>
+          <p:cNvSpPr>
+            <a:spLocks noGrp="1" noRot="1" noChangeAspect="1" noMove="1" noResize="1" noEditPoints="1" noAdjustHandles="1" noChangeArrowheads="1" noChangeShapeType="1" noTextEdit="1"/>
+          </p:cNvSpPr>
+          <p:nvPr>
+            <p:extLst>
+              <p:ext uri="{386F3935-93C4-4BCD-93E2-E3B085C9AB24}">
+                <p16:designElem xmlns:p16="http://schemas.microsoft.com/office/powerpoint/2015/main" val="1"/>
+              </p:ext>
+            </p:extLst>
+          </p:nvPr>
+        </p:nvSpPr>
+        <p:spPr>
+          <a:xfrm>
+            <a:off x="1" y="0"/>
+            <a:ext cx="12191998" cy="6858000"/>
+          </a:xfrm>
+          <a:prstGeom prst="rect">
+            <a:avLst/>
+          </a:prstGeom>
+          <a:gradFill>
+            <a:gsLst>
+              <a:gs pos="0">
+                <a:schemeClr val="accent1">
+                  <a:lumMod val="90000"/>
+                </a:schemeClr>
+              </a:gs>
+              <a:gs pos="25000">
+                <a:schemeClr val="accent1">
+                  <a:lumMod val="90000"/>
+                </a:schemeClr>
+              </a:gs>
+              <a:gs pos="94000">
+                <a:schemeClr val="bg2">
+                  <a:lumMod val="25000"/>
+                </a:schemeClr>
+              </a:gs>
+              <a:gs pos="100000">
+                <a:schemeClr val="bg2">
+                  <a:lumMod val="25000"/>
+                </a:schemeClr>
+              </a:gs>
+            </a:gsLst>
+            <a:lin ang="4200000" scaled="0"/>
+          </a:gradFill>
+          <a:ln>
+            <a:noFill/>
+          </a:ln>
+        </p:spPr>
+        <p:style>
+          <a:lnRef idx="2">
+            <a:schemeClr val="accent1">
+              <a:shade val="50000"/>
+            </a:schemeClr>
+          </a:lnRef>
+          <a:fillRef idx="1">
+            <a:schemeClr val="accent1"/>
+          </a:fillRef>
+          <a:effectRef idx="0">
+            <a:schemeClr val="accent1"/>
+          </a:effectRef>
+          <a:fontRef idx="minor">
+            <a:schemeClr val="lt1"/>
+          </a:fontRef>
+        </p:style>
+        <p:txBody>
+          <a:bodyPr rtlCol="0" anchor="ctr"/>
+          <a:lstStyle/>
+          <a:p>
+            <a:pPr algn="ctr"/>
+            <a:endParaRPr lang="en-US"/>
+          </a:p>
+        </p:txBody>
+      </p:sp>
+      <p:pic>
+        <p:nvPicPr>
+          <p:cNvPr id="13" name="Picture 12">
+            <a:extLst>
+              <a:ext uri="{FF2B5EF4-FFF2-40B4-BE49-F238E27FC236}">
+                <a16:creationId xmlns:a16="http://schemas.microsoft.com/office/drawing/2014/main" id="{2897127E-6CEF-446C-BE87-93B7C46E49D1}"/>
+              </a:ext>
+              <a:ext uri="{C183D7F6-B498-43B3-948B-1728B52AA6E4}">
+                <adec:decorative xmlns:adec="http://schemas.microsoft.com/office/drawing/2017/decorative" val="1"/>
+              </a:ext>
+            </a:extLst>
+          </p:cNvPr>
+          <p:cNvPicPr>
+            <a:picLocks noGrp="1" noRot="1" noChangeAspect="1" noMove="1" noResize="1" noEditPoints="1" noAdjustHandles="1" noChangeArrowheads="1" noChangeShapeType="1" noCrop="1"/>
+          </p:cNvPicPr>
+          <p:nvPr>
+            <p:extLst>
+              <p:ext uri="{386F3935-93C4-4BCD-93E2-E3B085C9AB24}">
+                <p16:designElem xmlns:p16="http://schemas.microsoft.com/office/powerpoint/2015/main" val="1"/>
+              </p:ext>
+            </p:extLst>
+          </p:nvPr>
+        </p:nvPicPr>
+        <p:blipFill>
+          <a:blip r:embed="rId2">
+            <a:extLst>
+              <a:ext uri="{28A0092B-C50C-407E-A947-70E740481C1C}">
+                <a14:useLocalDpi xmlns:a14="http://schemas.microsoft.com/office/drawing/2010/main" val="0"/>
+              </a:ext>
+            </a:extLst>
+          </a:blip>
+          <a:stretch>
+            <a:fillRect/>
+          </a:stretch>
+        </p:blipFill>
+        <p:spPr>
+          <a:xfrm>
+            <a:off x="0" y="0"/>
+            <a:ext cx="12192000" cy="6858000"/>
+          </a:xfrm>
+          <a:prstGeom prst="rect">
+            <a:avLst/>
+          </a:prstGeom>
+        </p:spPr>
+      </p:pic>
+      <p:sp>
+        <p:nvSpPr>
+          <p:cNvPr id="2" name="Title 1"/>
+          <p:cNvSpPr>
+            <a:spLocks noGrp="1"/>
+          </p:cNvSpPr>
+          <p:nvPr>
+            <p:ph type="title"/>
+          </p:nvPr>
+        </p:nvSpPr>
+        <p:spPr>
+          <a:xfrm>
+            <a:off x="640079" y="2053641"/>
+            <a:ext cx="3669161" cy="2760098"/>
+          </a:xfrm>
+        </p:spPr>
+        <p:txBody>
+          <a:bodyPr>
+            <a:normAutofit/>
+          </a:bodyPr>
+          <a:lstStyle/>
+          <a:p>
+            <a:r>
+              <a:rPr lang="en-US" dirty="0">
+                <a:solidFill>
+                  <a:srgbClr val="FFFFFF"/>
+                </a:solidFill>
+              </a:rPr>
+              <a:t>Fin</a:t>
+            </a:r>
+          </a:p>
+        </p:txBody>
+      </p:sp>
+      <p:sp>
+        <p:nvSpPr>
+          <p:cNvPr id="3" name="Slide Number Placeholder 2">
+            <a:extLst>
+              <a:ext uri="{FF2B5EF4-FFF2-40B4-BE49-F238E27FC236}">
+                <a16:creationId xmlns:a16="http://schemas.microsoft.com/office/drawing/2014/main" id="{44CF5CC1-6533-6043-9D5F-346506703E3A}"/>
+              </a:ext>
+            </a:extLst>
+          </p:cNvPr>
+          <p:cNvSpPr>
+            <a:spLocks noGrp="1"/>
+          </p:cNvSpPr>
+          <p:nvPr>
+            <p:ph type="sldNum" sz="quarter" idx="12"/>
+          </p:nvPr>
+        </p:nvSpPr>
+        <p:spPr/>
+        <p:txBody>
+          <a:bodyPr/>
+          <a:lstStyle/>
+          <a:p>
+            <a:fld id="{3352CBF5-17B8-4387-88A6-ABF9F8C64D5A}" type="slidenum">
+              <a:rPr lang="en-US" smtClean="0"/>
+              <a:t>11</a:t>
+            </a:fld>
+            <a:endParaRPr lang="en-US"/>
+          </a:p>
+        </p:txBody>
+      </p:sp>
+    </p:spTree>
+    <p:extLst>
+      <p:ext uri="{BB962C8B-B14F-4D97-AF65-F5344CB8AC3E}">
+        <p14:creationId xmlns:p14="http://schemas.microsoft.com/office/powerpoint/2010/main" val="628979899"/>
+      </p:ext>
+    </p:extLst>
+  </p:cSld>
+  <p:clrMapOvr>
+    <a:masterClrMapping/>
+  </p:clrMapOvr>
+</p:sld>
+</file>
+
 <file path=ppt/slides/slide2.xml><?xml version="1.0" encoding="utf-8"?>
 <p:sld xmlns:a="http://schemas.openxmlformats.org/drawingml/2006/main" xmlns:r="http://schemas.openxmlformats.org/officeDocument/2006/relationships" xmlns:p="http://schemas.openxmlformats.org/presentationml/2006/main">
   <p:cSld>
@@ -5144,14 +5649,6 @@
 <file path=ppt/slides/slide9.xml><?xml version="1.0" encoding="utf-8"?>
 <p:sld xmlns:a="http://schemas.openxmlformats.org/drawingml/2006/main" xmlns:r="http://schemas.openxmlformats.org/officeDocument/2006/relationships" xmlns:p="http://schemas.openxmlformats.org/presentationml/2006/main">
   <p:cSld>
-    <p:bg>
-      <p:bgPr>
-        <a:solidFill>
-          <a:schemeClr val="bg1"/>
-        </a:solidFill>
-        <a:effectLst/>
-      </p:bgPr>
-    </p:bg>
     <p:spTree>
       <p:nvGrpSpPr>
         <p:cNvPr id="1" name=""/>
@@ -5166,262 +5663,799 @@
           <a:chExt cx="0" cy="0"/>
         </a:xfrm>
       </p:grpSpPr>
-      <p:sp useBgFill="1">
-        <p:nvSpPr>
-          <p:cNvPr id="9" name="Rectangle 8">
+      <p:sp>
+        <p:nvSpPr>
+          <p:cNvPr id="2" name="Title 1">
             <a:extLst>
               <a:ext uri="{FF2B5EF4-FFF2-40B4-BE49-F238E27FC236}">
-                <a16:creationId xmlns:a16="http://schemas.microsoft.com/office/drawing/2014/main" id="{3B854194-185D-494D-905C-7C7CB2E30F6E}"/>
-              </a:ext>
-              <a:ext uri="{C183D7F6-B498-43B3-948B-1728B52AA6E4}">
-                <adec:decorative xmlns:adec="http://schemas.microsoft.com/office/drawing/2017/decorative" val="1"/>
+                <a16:creationId xmlns:a16="http://schemas.microsoft.com/office/drawing/2014/main" id="{AB29AA8C-66BE-2148-BE56-1850E35A1C48}"/>
               </a:ext>
             </a:extLst>
           </p:cNvPr>
           <p:cNvSpPr>
-            <a:spLocks noGrp="1" noRot="1" noChangeAspect="1" noMove="1" noResize="1" noEditPoints="1" noAdjustHandles="1" noChangeArrowheads="1" noChangeShapeType="1" noTextEdit="1"/>
-          </p:cNvSpPr>
-          <p:nvPr>
-            <p:extLst>
-              <p:ext uri="{386F3935-93C4-4BCD-93E2-E3B085C9AB24}">
-                <p16:designElem xmlns:p16="http://schemas.microsoft.com/office/powerpoint/2015/main" val="1"/>
-              </p:ext>
-            </p:extLst>
-          </p:nvPr>
-        </p:nvSpPr>
-        <p:spPr>
-          <a:xfrm>
-            <a:off x="1" y="0"/>
-            <a:ext cx="6082110" cy="6858000"/>
-          </a:xfrm>
-          <a:prstGeom prst="rect">
-            <a:avLst/>
-          </a:prstGeom>
-          <a:ln>
-            <a:noFill/>
-          </a:ln>
-        </p:spPr>
-        <p:style>
-          <a:lnRef idx="2">
-            <a:schemeClr val="accent1">
-              <a:shade val="50000"/>
-            </a:schemeClr>
-          </a:lnRef>
-          <a:fillRef idx="1">
-            <a:schemeClr val="accent1"/>
-          </a:fillRef>
-          <a:effectRef idx="0">
-            <a:schemeClr val="accent1"/>
-          </a:effectRef>
-          <a:fontRef idx="minor">
-            <a:schemeClr val="lt1"/>
-          </a:fontRef>
-        </p:style>
-        <p:txBody>
-          <a:bodyPr rtlCol="0" anchor="ctr"/>
-          <a:lstStyle/>
-          <a:p>
-            <a:pPr algn="ctr"/>
-            <a:endParaRPr lang="en-US"/>
-          </a:p>
-        </p:txBody>
-      </p:sp>
-      <p:sp>
-        <p:nvSpPr>
-          <p:cNvPr id="11" name="Rectangle 10">
+            <a:spLocks noGrp="1"/>
+          </p:cNvSpPr>
+          <p:nvPr>
+            <p:ph type="title"/>
+          </p:nvPr>
+        </p:nvSpPr>
+        <p:spPr/>
+        <p:txBody>
+          <a:bodyPr/>
+          <a:lstStyle/>
+          <a:p>
+            <a:r>
+              <a:rPr lang="en-US" dirty="0"/>
+              <a:t>Storytime…</a:t>
+            </a:r>
+          </a:p>
+        </p:txBody>
+      </p:sp>
+      <p:sp>
+        <p:nvSpPr>
+          <p:cNvPr id="3" name="Content Placeholder 2">
             <a:extLst>
               <a:ext uri="{FF2B5EF4-FFF2-40B4-BE49-F238E27FC236}">
-                <a16:creationId xmlns:a16="http://schemas.microsoft.com/office/drawing/2014/main" id="{B4F5FA0D-0104-4987-8241-EFF7C85B88DE}"/>
-              </a:ext>
-              <a:ext uri="{C183D7F6-B498-43B3-948B-1728B52AA6E4}">
-                <adec:decorative xmlns:adec="http://schemas.microsoft.com/office/drawing/2017/decorative" val="1"/>
+                <a16:creationId xmlns:a16="http://schemas.microsoft.com/office/drawing/2014/main" id="{5316DF2F-4D03-DD4B-94E2-524B92FB83EF}"/>
               </a:ext>
             </a:extLst>
           </p:cNvPr>
           <p:cNvSpPr>
-            <a:spLocks noGrp="1" noRot="1" noChangeAspect="1" noMove="1" noResize="1" noEditPoints="1" noAdjustHandles="1" noChangeArrowheads="1" noChangeShapeType="1" noTextEdit="1"/>
-          </p:cNvSpPr>
-          <p:nvPr>
-            <p:extLst>
-              <p:ext uri="{386F3935-93C4-4BCD-93E2-E3B085C9AB24}">
-                <p16:designElem xmlns:p16="http://schemas.microsoft.com/office/powerpoint/2015/main" val="1"/>
-              </p:ext>
-            </p:extLst>
+            <a:spLocks noGrp="1"/>
+          </p:cNvSpPr>
+          <p:nvPr>
+            <p:ph idx="1"/>
           </p:nvPr>
         </p:nvSpPr>
         <p:spPr>
           <a:xfrm>
-            <a:off x="1" y="0"/>
-            <a:ext cx="12191998" cy="6858000"/>
+            <a:off x="838199" y="1825625"/>
+            <a:ext cx="6023759" cy="4351338"/>
           </a:xfrm>
-          <a:prstGeom prst="rect">
-            <a:avLst/>
-          </a:prstGeom>
-          <a:gradFill>
-            <a:gsLst>
-              <a:gs pos="0">
-                <a:schemeClr val="accent1">
-                  <a:lumMod val="90000"/>
-                </a:schemeClr>
-              </a:gs>
-              <a:gs pos="25000">
-                <a:schemeClr val="accent1">
-                  <a:lumMod val="90000"/>
-                </a:schemeClr>
-              </a:gs>
-              <a:gs pos="94000">
-                <a:schemeClr val="bg2">
-                  <a:lumMod val="25000"/>
-                </a:schemeClr>
-              </a:gs>
-              <a:gs pos="100000">
-                <a:schemeClr val="bg2">
-                  <a:lumMod val="25000"/>
-                </a:schemeClr>
-              </a:gs>
-            </a:gsLst>
-            <a:lin ang="4200000" scaled="0"/>
-          </a:gradFill>
-          <a:ln>
-            <a:noFill/>
-          </a:ln>
         </p:spPr>
-        <p:style>
-          <a:lnRef idx="2">
-            <a:schemeClr val="accent1">
-              <a:shade val="50000"/>
-            </a:schemeClr>
-          </a:lnRef>
-          <a:fillRef idx="1">
-            <a:schemeClr val="accent1"/>
-          </a:fillRef>
-          <a:effectRef idx="0">
-            <a:schemeClr val="accent1"/>
-          </a:effectRef>
-          <a:fontRef idx="minor">
-            <a:schemeClr val="lt1"/>
-          </a:fontRef>
-        </p:style>
-        <p:txBody>
-          <a:bodyPr rtlCol="0" anchor="ctr"/>
-          <a:lstStyle/>
-          <a:p>
-            <a:pPr algn="ctr"/>
-            <a:endParaRPr lang="en-US"/>
-          </a:p>
-        </p:txBody>
-      </p:sp>
-      <p:pic>
-        <p:nvPicPr>
-          <p:cNvPr id="13" name="Picture 12">
+        <p:txBody>
+          <a:bodyPr>
+            <a:normAutofit fontScale="55000" lnSpcReduction="20000"/>
+          </a:bodyPr>
+          <a:lstStyle/>
+          <a:p>
+            <a:pPr marL="0" indent="0">
+              <a:buNone/>
+            </a:pPr>
+            <a:r>
+              <a:rPr lang="en-US" dirty="0"/>
+              <a:t>  </a:t>
+            </a:r>
+            <a:r>
+              <a:rPr lang="en-US" dirty="0" err="1"/>
+              <a:t>segment_intersect_kernel</a:t>
+            </a:r>
+            <a:r>
+              <a:rPr lang="en-US" dirty="0"/>
+              <a:t>(s1, s2: segment_2d):</a:t>
+            </a:r>
+          </a:p>
+          <a:p>
+            <a:pPr marL="0" indent="0">
+              <a:buNone/>
+            </a:pPr>
+            <a:r>
+              <a:rPr lang="en-US" dirty="0"/>
+              <a:t>      [</a:t>
+            </a:r>
+            <a:r>
+              <a:rPr lang="en-US" dirty="0" err="1"/>
+              <a:t>segment_intersection_type</a:t>
+            </a:r>
+            <a:r>
+              <a:rPr lang="en-US" dirty="0"/>
+              <a:t>, point_2d] =</a:t>
+            </a:r>
+          </a:p>
+          <a:p>
+            <a:pPr marL="0" indent="0">
+              <a:buNone/>
+            </a:pPr>
+            <a:r>
+              <a:rPr lang="en-US" dirty="0"/>
+              <a:t>    LET p: point_2d = s1`p1 IN</a:t>
+            </a:r>
+          </a:p>
+          <a:p>
+            <a:pPr marL="0" indent="0">
+              <a:buNone/>
+            </a:pPr>
+            <a:r>
+              <a:rPr lang="en-US" dirty="0"/>
+              <a:t>    LET r: vector_2d = vector_from_point_to_point(s1`p1, s1`p2) IN</a:t>
+            </a:r>
+          </a:p>
+          <a:p>
+            <a:pPr marL="0" indent="0">
+              <a:buNone/>
+            </a:pPr>
+            <a:r>
+              <a:rPr lang="en-US" dirty="0"/>
+              <a:t>    LET q: point_2d = s2`p1 IN</a:t>
+            </a:r>
+          </a:p>
+          <a:p>
+            <a:pPr marL="0" indent="0">
+              <a:buNone/>
+            </a:pPr>
+            <a:r>
+              <a:rPr lang="en-US" dirty="0"/>
+              <a:t>    LET s: vector_2d = vector_from_point_to_point(s2`p1, s2`p2) IN</a:t>
+            </a:r>
+          </a:p>
+          <a:p>
+            <a:pPr marL="0" indent="0">
+              <a:buNone/>
+            </a:pPr>
+            <a:r>
+              <a:rPr lang="en-US" dirty="0"/>
+              <a:t>    LET </a:t>
+            </a:r>
+            <a:r>
+              <a:rPr lang="en-US" dirty="0" err="1"/>
+              <a:t>r_cross_s</a:t>
+            </a:r>
+            <a:r>
+              <a:rPr lang="en-US" dirty="0"/>
+              <a:t>: real = cross(r, s) IN</a:t>
+            </a:r>
+          </a:p>
+          <a:p>
+            <a:pPr marL="0" indent="0">
+              <a:buNone/>
+            </a:pPr>
+            <a:r>
+              <a:rPr lang="en-US" dirty="0"/>
+              <a:t>    LET </a:t>
+            </a:r>
+            <a:r>
+              <a:rPr lang="en-US" dirty="0" err="1"/>
+              <a:t>q_minus_p_cross_r</a:t>
+            </a:r>
+            <a:r>
+              <a:rPr lang="en-US" dirty="0"/>
+              <a:t>: real = cross((q - p), r) IN</a:t>
+            </a:r>
+          </a:p>
+          <a:p>
+            <a:pPr marL="0" indent="0">
+              <a:buNone/>
+            </a:pPr>
+            <a:r>
+              <a:rPr lang="en-US" dirty="0"/>
+              <a:t>    IF ((</a:t>
+            </a:r>
+            <a:r>
+              <a:rPr lang="en-US" dirty="0" err="1"/>
+              <a:t>r_cross_s</a:t>
+            </a:r>
+            <a:r>
+              <a:rPr lang="en-US" dirty="0"/>
+              <a:t> = 0) AND (</a:t>
+            </a:r>
+            <a:r>
+              <a:rPr lang="en-US" dirty="0" err="1"/>
+              <a:t>q_minus_p_cross_r</a:t>
+            </a:r>
+            <a:r>
+              <a:rPr lang="en-US" dirty="0"/>
+              <a:t> = 0)) THEN          </a:t>
+            </a:r>
+          </a:p>
+          <a:p>
+            <a:pPr marL="0" indent="0">
+              <a:buNone/>
+            </a:pPr>
+            <a:r>
+              <a:rPr lang="en-US" dirty="0"/>
+              <a:t>      LET t0: real = (s2`p1 - s1`p1) * r IN</a:t>
+            </a:r>
+          </a:p>
+          <a:p>
+            <a:pPr marL="0" indent="0">
+              <a:buNone/>
+            </a:pPr>
+            <a:r>
+              <a:rPr lang="en-US" dirty="0"/>
+              <a:t>      LET t1: real = (s2`p2 - s1`p1) * r IN</a:t>
+            </a:r>
+          </a:p>
+          <a:p>
+            <a:pPr marL="0" indent="0">
+              <a:buNone/>
+            </a:pPr>
+            <a:r>
+              <a:rPr lang="en-US" dirty="0"/>
+              <a:t>      LET </a:t>
+            </a:r>
+            <a:r>
+              <a:rPr lang="en-US" dirty="0" err="1"/>
+              <a:t>norm_sq</a:t>
+            </a:r>
+            <a:r>
+              <a:rPr lang="en-US" dirty="0"/>
+              <a:t>: </a:t>
+            </a:r>
+            <a:r>
+              <a:rPr lang="en-US" dirty="0" err="1"/>
+              <a:t>nnreal</a:t>
+            </a:r>
+            <a:r>
+              <a:rPr lang="en-US" dirty="0"/>
+              <a:t> = r * r IN</a:t>
+            </a:r>
+          </a:p>
+          <a:p>
+            <a:pPr marL="0" indent="0">
+              <a:buNone/>
+            </a:pPr>
+            <a:r>
+              <a:rPr lang="en-US" dirty="0"/>
+              <a:t>      IF ((0 &lt;= t0 AND t0 &lt;= </a:t>
+            </a:r>
+            <a:r>
+              <a:rPr lang="en-US" dirty="0" err="1"/>
+              <a:t>norm_sq</a:t>
+            </a:r>
+            <a:r>
+              <a:rPr lang="en-US" dirty="0"/>
+              <a:t>) OR (0 &lt;= t1 AND t1 &lt;= </a:t>
+            </a:r>
+            <a:r>
+              <a:rPr lang="en-US" dirty="0" err="1"/>
+              <a:t>norm_sq</a:t>
+            </a:r>
+            <a:r>
+              <a:rPr lang="en-US" dirty="0"/>
+              <a:t>)) THEN</a:t>
+            </a:r>
+          </a:p>
+          <a:p>
+            <a:pPr marL="0" indent="0">
+              <a:buNone/>
+            </a:pPr>
+            <a:r>
+              <a:rPr lang="en-US" dirty="0"/>
+              <a:t>        (</a:t>
+            </a:r>
+            <a:r>
+              <a:rPr lang="en-US" dirty="0" err="1"/>
+              <a:t>Collinear_Overlapping</a:t>
+            </a:r>
+            <a:r>
+              <a:rPr lang="en-US" dirty="0"/>
+              <a:t>, </a:t>
+            </a:r>
+            <a:r>
+              <a:rPr lang="en-US" dirty="0" err="1"/>
+              <a:t>zero_point</a:t>
+            </a:r>
+            <a:r>
+              <a:rPr lang="en-US" dirty="0"/>
+              <a:t>)</a:t>
+            </a:r>
+          </a:p>
+          <a:p>
+            <a:pPr marL="0" indent="0">
+              <a:buNone/>
+            </a:pPr>
+            <a:endParaRPr lang="en-US" dirty="0"/>
+          </a:p>
+        </p:txBody>
+      </p:sp>
+      <p:sp>
+        <p:nvSpPr>
+          <p:cNvPr id="4" name="Slide Number Placeholder 3">
             <a:extLst>
               <a:ext uri="{FF2B5EF4-FFF2-40B4-BE49-F238E27FC236}">
-                <a16:creationId xmlns:a16="http://schemas.microsoft.com/office/drawing/2014/main" id="{2897127E-6CEF-446C-BE87-93B7C46E49D1}"/>
-              </a:ext>
-              <a:ext uri="{C183D7F6-B498-43B3-948B-1728B52AA6E4}">
-                <adec:decorative xmlns:adec="http://schemas.microsoft.com/office/drawing/2017/decorative" val="1"/>
+                <a16:creationId xmlns:a16="http://schemas.microsoft.com/office/drawing/2014/main" id="{DF7F2A05-525D-6744-B9C8-BF24F4549E3F}"/>
               </a:ext>
             </a:extLst>
           </p:cNvPr>
-          <p:cNvPicPr>
-            <a:picLocks noGrp="1" noRot="1" noChangeAspect="1" noMove="1" noResize="1" noEditPoints="1" noAdjustHandles="1" noChangeArrowheads="1" noChangeShapeType="1" noCrop="1"/>
-          </p:cNvPicPr>
-          <p:nvPr>
-            <p:extLst>
-              <p:ext uri="{386F3935-93C4-4BCD-93E2-E3B085C9AB24}">
-                <p16:designElem xmlns:p16="http://schemas.microsoft.com/office/powerpoint/2015/main" val="1"/>
-              </p:ext>
-            </p:extLst>
-          </p:nvPr>
-        </p:nvPicPr>
-        <p:blipFill>
-          <a:blip r:embed="rId2">
+          <p:cNvSpPr>
+            <a:spLocks noGrp="1"/>
+          </p:cNvSpPr>
+          <p:nvPr>
+            <p:ph type="sldNum" sz="quarter" idx="12"/>
+          </p:nvPr>
+        </p:nvSpPr>
+        <p:spPr/>
+        <p:txBody>
+          <a:bodyPr/>
+          <a:lstStyle/>
+          <a:p>
+            <a:fld id="{3352CBF5-17B8-4387-88A6-ABF9F8C64D5A}" type="slidenum">
+              <a:rPr lang="en-US" smtClean="0"/>
+              <a:t>9</a:t>
+            </a:fld>
+            <a:endParaRPr lang="en-US"/>
+          </a:p>
+        </p:txBody>
+      </p:sp>
+      <p:sp>
+        <p:nvSpPr>
+          <p:cNvPr id="5" name="Content Placeholder 2">
             <a:extLst>
-              <a:ext uri="{28A0092B-C50C-407E-A947-70E740481C1C}">
-                <a14:useLocalDpi xmlns:a14="http://schemas.microsoft.com/office/drawing/2010/main" val="0"/>
+              <a:ext uri="{FF2B5EF4-FFF2-40B4-BE49-F238E27FC236}">
+                <a16:creationId xmlns:a16="http://schemas.microsoft.com/office/drawing/2014/main" id="{EE5CAAEA-83FC-D64B-AD40-D7034578A015}"/>
               </a:ext>
             </a:extLst>
-          </a:blip>
-          <a:stretch>
-            <a:fillRect/>
-          </a:stretch>
-        </p:blipFill>
+          </p:cNvPr>
+          <p:cNvSpPr txBox="1">
+            <a:spLocks/>
+          </p:cNvSpPr>
+          <p:nvPr/>
+        </p:nvSpPr>
         <p:spPr>
           <a:xfrm>
-            <a:off x="0" y="0"/>
-            <a:ext cx="12192000" cy="6858000"/>
+            <a:off x="6861959" y="1825625"/>
+            <a:ext cx="5330041" cy="4351338"/>
           </a:xfrm>
           <a:prstGeom prst="rect">
             <a:avLst/>
           </a:prstGeom>
         </p:spPr>
-      </p:pic>
-      <p:sp>
-        <p:nvSpPr>
-          <p:cNvPr id="2" name="Title 1"/>
-          <p:cNvSpPr>
-            <a:spLocks noGrp="1"/>
-          </p:cNvSpPr>
-          <p:nvPr>
-            <p:ph type="title"/>
-          </p:nvPr>
-        </p:nvSpPr>
-        <p:spPr>
-          <a:xfrm>
-            <a:off x="640079" y="2053641"/>
-            <a:ext cx="3669161" cy="2760098"/>
-          </a:xfrm>
-        </p:spPr>
-        <p:txBody>
-          <a:bodyPr>
-            <a:normAutofit/>
+        <p:txBody>
+          <a:bodyPr vert="horz" lIns="91440" tIns="45720" rIns="91440" bIns="45720" rtlCol="0">
+            <a:normAutofit fontScale="55000" lnSpcReduction="20000"/>
           </a:bodyPr>
-          <a:lstStyle/>
-          <a:p>
-            <a:r>
-              <a:rPr lang="en-US" dirty="0">
+          <a:lstStyle>
+            <a:lvl1pPr marL="228600" indent="-228600" algn="l" defTabSz="914400" rtl="0" eaLnBrk="1" latinLnBrk="0" hangingPunct="1">
+              <a:lnSpc>
+                <a:spcPct val="90000"/>
+              </a:lnSpc>
+              <a:spcBef>
+                <a:spcPts val="1000"/>
+              </a:spcBef>
+              <a:buFont typeface="Arial" panose="020B0604020202020204" pitchFamily="34" charset="0"/>
+              <a:buChar char="•"/>
+              <a:defRPr sz="2800" kern="1200">
                 <a:solidFill>
-                  <a:srgbClr val="FFFFFF"/>
+                  <a:schemeClr val="tx1"/>
                 </a:solidFill>
-              </a:rPr>
-              <a:t>Fin</a:t>
-            </a:r>
-          </a:p>
-        </p:txBody>
-      </p:sp>
-      <p:sp>
-        <p:nvSpPr>
-          <p:cNvPr id="3" name="Slide Number Placeholder 2">
-            <a:extLst>
-              <a:ext uri="{FF2B5EF4-FFF2-40B4-BE49-F238E27FC236}">
-                <a16:creationId xmlns:a16="http://schemas.microsoft.com/office/drawing/2014/main" id="{44CF5CC1-6533-6043-9D5F-346506703E3A}"/>
-              </a:ext>
-            </a:extLst>
-          </p:cNvPr>
-          <p:cNvSpPr>
-            <a:spLocks noGrp="1"/>
-          </p:cNvSpPr>
-          <p:nvPr>
-            <p:ph type="sldNum" sz="quarter" idx="12"/>
-          </p:nvPr>
-        </p:nvSpPr>
-        <p:spPr/>
-        <p:txBody>
-          <a:bodyPr/>
-          <a:lstStyle/>
-          <a:p>
-            <a:fld id="{3352CBF5-17B8-4387-88A6-ABF9F8C64D5A}" type="slidenum">
-              <a:rPr lang="en-US" smtClean="0"/>
-              <a:t>9</a:t>
-            </a:fld>
-            <a:endParaRPr lang="en-US"/>
+                <a:latin typeface="+mn-lt"/>
+                <a:ea typeface="+mn-ea"/>
+                <a:cs typeface="+mn-cs"/>
+              </a:defRPr>
+            </a:lvl1pPr>
+            <a:lvl2pPr marL="685800" indent="-228600" algn="l" defTabSz="914400" rtl="0" eaLnBrk="1" latinLnBrk="0" hangingPunct="1">
+              <a:lnSpc>
+                <a:spcPct val="90000"/>
+              </a:lnSpc>
+              <a:spcBef>
+                <a:spcPts val="500"/>
+              </a:spcBef>
+              <a:buFont typeface="Arial" panose="020B0604020202020204" pitchFamily="34" charset="0"/>
+              <a:buChar char="•"/>
+              <a:defRPr sz="2400" kern="1200">
+                <a:solidFill>
+                  <a:schemeClr val="tx1"/>
+                </a:solidFill>
+                <a:latin typeface="+mn-lt"/>
+                <a:ea typeface="+mn-ea"/>
+                <a:cs typeface="+mn-cs"/>
+              </a:defRPr>
+            </a:lvl2pPr>
+            <a:lvl3pPr marL="1143000" indent="-228600" algn="l" defTabSz="914400" rtl="0" eaLnBrk="1" latinLnBrk="0" hangingPunct="1">
+              <a:lnSpc>
+                <a:spcPct val="90000"/>
+              </a:lnSpc>
+              <a:spcBef>
+                <a:spcPts val="500"/>
+              </a:spcBef>
+              <a:buFont typeface="Arial" panose="020B0604020202020204" pitchFamily="34" charset="0"/>
+              <a:buChar char="•"/>
+              <a:defRPr sz="2000" kern="1200">
+                <a:solidFill>
+                  <a:schemeClr val="tx1"/>
+                </a:solidFill>
+                <a:latin typeface="+mn-lt"/>
+                <a:ea typeface="+mn-ea"/>
+                <a:cs typeface="+mn-cs"/>
+              </a:defRPr>
+            </a:lvl3pPr>
+            <a:lvl4pPr marL="1600200" indent="-228600" algn="l" defTabSz="914400" rtl="0" eaLnBrk="1" latinLnBrk="0" hangingPunct="1">
+              <a:lnSpc>
+                <a:spcPct val="90000"/>
+              </a:lnSpc>
+              <a:spcBef>
+                <a:spcPts val="500"/>
+              </a:spcBef>
+              <a:buFont typeface="Arial" panose="020B0604020202020204" pitchFamily="34" charset="0"/>
+              <a:buChar char="•"/>
+              <a:defRPr sz="1800" kern="1200">
+                <a:solidFill>
+                  <a:schemeClr val="tx1"/>
+                </a:solidFill>
+                <a:latin typeface="+mn-lt"/>
+                <a:ea typeface="+mn-ea"/>
+                <a:cs typeface="+mn-cs"/>
+              </a:defRPr>
+            </a:lvl4pPr>
+            <a:lvl5pPr marL="2057400" indent="-228600" algn="l" defTabSz="914400" rtl="0" eaLnBrk="1" latinLnBrk="0" hangingPunct="1">
+              <a:lnSpc>
+                <a:spcPct val="90000"/>
+              </a:lnSpc>
+              <a:spcBef>
+                <a:spcPts val="500"/>
+              </a:spcBef>
+              <a:buFont typeface="Arial" panose="020B0604020202020204" pitchFamily="34" charset="0"/>
+              <a:buChar char="•"/>
+              <a:defRPr sz="1800" kern="1200">
+                <a:solidFill>
+                  <a:schemeClr val="tx1"/>
+                </a:solidFill>
+                <a:latin typeface="+mn-lt"/>
+                <a:ea typeface="+mn-ea"/>
+                <a:cs typeface="+mn-cs"/>
+              </a:defRPr>
+            </a:lvl5pPr>
+            <a:lvl6pPr marL="2514600" indent="-228600" algn="l" defTabSz="914400" rtl="0" eaLnBrk="1" latinLnBrk="0" hangingPunct="1">
+              <a:lnSpc>
+                <a:spcPct val="90000"/>
+              </a:lnSpc>
+              <a:spcBef>
+                <a:spcPts val="500"/>
+              </a:spcBef>
+              <a:buFont typeface="Arial" panose="020B0604020202020204" pitchFamily="34" charset="0"/>
+              <a:buChar char="•"/>
+              <a:defRPr sz="1800" kern="1200">
+                <a:solidFill>
+                  <a:schemeClr val="tx1"/>
+                </a:solidFill>
+                <a:latin typeface="+mn-lt"/>
+                <a:ea typeface="+mn-ea"/>
+                <a:cs typeface="+mn-cs"/>
+              </a:defRPr>
+            </a:lvl6pPr>
+            <a:lvl7pPr marL="2971800" indent="-228600" algn="l" defTabSz="914400" rtl="0" eaLnBrk="1" latinLnBrk="0" hangingPunct="1">
+              <a:lnSpc>
+                <a:spcPct val="90000"/>
+              </a:lnSpc>
+              <a:spcBef>
+                <a:spcPts val="500"/>
+              </a:spcBef>
+              <a:buFont typeface="Arial" panose="020B0604020202020204" pitchFamily="34" charset="0"/>
+              <a:buChar char="•"/>
+              <a:defRPr sz="1800" kern="1200">
+                <a:solidFill>
+                  <a:schemeClr val="tx1"/>
+                </a:solidFill>
+                <a:latin typeface="+mn-lt"/>
+                <a:ea typeface="+mn-ea"/>
+                <a:cs typeface="+mn-cs"/>
+              </a:defRPr>
+            </a:lvl7pPr>
+            <a:lvl8pPr marL="3429000" indent="-228600" algn="l" defTabSz="914400" rtl="0" eaLnBrk="1" latinLnBrk="0" hangingPunct="1">
+              <a:lnSpc>
+                <a:spcPct val="90000"/>
+              </a:lnSpc>
+              <a:spcBef>
+                <a:spcPts val="500"/>
+              </a:spcBef>
+              <a:buFont typeface="Arial" panose="020B0604020202020204" pitchFamily="34" charset="0"/>
+              <a:buChar char="•"/>
+              <a:defRPr sz="1800" kern="1200">
+                <a:solidFill>
+                  <a:schemeClr val="tx1"/>
+                </a:solidFill>
+                <a:latin typeface="+mn-lt"/>
+                <a:ea typeface="+mn-ea"/>
+                <a:cs typeface="+mn-cs"/>
+              </a:defRPr>
+            </a:lvl8pPr>
+            <a:lvl9pPr marL="3886200" indent="-228600" algn="l" defTabSz="914400" rtl="0" eaLnBrk="1" latinLnBrk="0" hangingPunct="1">
+              <a:lnSpc>
+                <a:spcPct val="90000"/>
+              </a:lnSpc>
+              <a:spcBef>
+                <a:spcPts val="500"/>
+              </a:spcBef>
+              <a:buFont typeface="Arial" panose="020B0604020202020204" pitchFamily="34" charset="0"/>
+              <a:buChar char="•"/>
+              <a:defRPr sz="1800" kern="1200">
+                <a:solidFill>
+                  <a:schemeClr val="tx1"/>
+                </a:solidFill>
+                <a:latin typeface="+mn-lt"/>
+                <a:ea typeface="+mn-ea"/>
+                <a:cs typeface="+mn-cs"/>
+              </a:defRPr>
+            </a:lvl9pPr>
+          </a:lstStyle>
+          <a:p>
+            <a:pPr marL="0" indent="0">
+              <a:buNone/>
+            </a:pPr>
+            <a:r>
+              <a:rPr lang="en-US" dirty="0"/>
+              <a:t>      ELSE</a:t>
+            </a:r>
+          </a:p>
+          <a:p>
+            <a:pPr marL="0" indent="0">
+              <a:buNone/>
+            </a:pPr>
+            <a:r>
+              <a:rPr lang="en-US" dirty="0"/>
+              <a:t>        (</a:t>
+            </a:r>
+            <a:r>
+              <a:rPr lang="en-US" dirty="0" err="1"/>
+              <a:t>Collinear_Non_Overlapping</a:t>
+            </a:r>
+            <a:r>
+              <a:rPr lang="en-US" dirty="0"/>
+              <a:t>, </a:t>
+            </a:r>
+            <a:r>
+              <a:rPr lang="en-US" dirty="0" err="1"/>
+              <a:t>zero_point</a:t>
+            </a:r>
+            <a:r>
+              <a:rPr lang="en-US" dirty="0"/>
+              <a:t>)</a:t>
+            </a:r>
+          </a:p>
+          <a:p>
+            <a:pPr marL="0" indent="0">
+              <a:buNone/>
+            </a:pPr>
+            <a:r>
+              <a:rPr lang="en-US" dirty="0"/>
+              <a:t>      ENDIF</a:t>
+            </a:r>
+          </a:p>
+          <a:p>
+            <a:pPr marL="0" indent="0">
+              <a:buFont typeface="Arial" panose="020B0604020202020204" pitchFamily="34" charset="0"/>
+              <a:buNone/>
+            </a:pPr>
+            <a:r>
+              <a:rPr lang="en-US" dirty="0"/>
+              <a:t>    ELSIF ((</a:t>
+            </a:r>
+            <a:r>
+              <a:rPr lang="en-US" dirty="0" err="1"/>
+              <a:t>r_cross_s</a:t>
+            </a:r>
+            <a:r>
+              <a:rPr lang="en-US" dirty="0"/>
+              <a:t> = 0) AND (</a:t>
+            </a:r>
+            <a:r>
+              <a:rPr lang="en-US" dirty="0" err="1"/>
+              <a:t>q_minus_p_cross_r</a:t>
+            </a:r>
+            <a:r>
+              <a:rPr lang="en-US" dirty="0"/>
+              <a:t> /= 0)) THEN</a:t>
+            </a:r>
+          </a:p>
+          <a:p>
+            <a:pPr marL="0" indent="0">
+              <a:buFont typeface="Arial" panose="020B0604020202020204" pitchFamily="34" charset="0"/>
+              <a:buNone/>
+            </a:pPr>
+            <a:r>
+              <a:rPr lang="en-US" dirty="0"/>
+              <a:t>      (Parallel, </a:t>
+            </a:r>
+            <a:r>
+              <a:rPr lang="en-US" dirty="0" err="1"/>
+              <a:t>zero_point</a:t>
+            </a:r>
+            <a:r>
+              <a:rPr lang="en-US" dirty="0"/>
+              <a:t>)</a:t>
+            </a:r>
+          </a:p>
+          <a:p>
+            <a:pPr marL="0" indent="0">
+              <a:buFont typeface="Arial" panose="020B0604020202020204" pitchFamily="34" charset="0"/>
+              <a:buNone/>
+            </a:pPr>
+            <a:r>
+              <a:rPr lang="en-US" dirty="0"/>
+              <a:t>    ELSE</a:t>
+            </a:r>
+          </a:p>
+          <a:p>
+            <a:pPr marL="0" indent="0">
+              <a:buFont typeface="Arial" panose="020B0604020202020204" pitchFamily="34" charset="0"/>
+              <a:buNone/>
+            </a:pPr>
+            <a:r>
+              <a:rPr lang="en-US" dirty="0"/>
+              <a:t>      LET </a:t>
+            </a:r>
+            <a:r>
+              <a:rPr lang="en-US" dirty="0" err="1"/>
+              <a:t>q_minus_p_cross_s</a:t>
+            </a:r>
+            <a:r>
+              <a:rPr lang="en-US" dirty="0"/>
+              <a:t>: real = cross((q - p), s) IN</a:t>
+            </a:r>
+          </a:p>
+          <a:p>
+            <a:pPr marL="0" indent="0">
+              <a:buFont typeface="Arial" panose="020B0604020202020204" pitchFamily="34" charset="0"/>
+              <a:buNone/>
+            </a:pPr>
+            <a:r>
+              <a:rPr lang="en-US" dirty="0"/>
+              <a:t>      LET t: real = </a:t>
+            </a:r>
+            <a:r>
+              <a:rPr lang="en-US" dirty="0" err="1"/>
+              <a:t>q_minus_p_cross_s</a:t>
+            </a:r>
+            <a:r>
+              <a:rPr lang="en-US" dirty="0"/>
+              <a:t> / </a:t>
+            </a:r>
+            <a:r>
+              <a:rPr lang="en-US" dirty="0" err="1"/>
+              <a:t>r_cross_s</a:t>
+            </a:r>
+            <a:r>
+              <a:rPr lang="en-US" dirty="0"/>
+              <a:t> IN</a:t>
+            </a:r>
+          </a:p>
+          <a:p>
+            <a:pPr marL="0" indent="0">
+              <a:buFont typeface="Arial" panose="020B0604020202020204" pitchFamily="34" charset="0"/>
+              <a:buNone/>
+            </a:pPr>
+            <a:r>
+              <a:rPr lang="en-US" dirty="0"/>
+              <a:t>      LET u: real = </a:t>
+            </a:r>
+            <a:r>
+              <a:rPr lang="en-US" dirty="0" err="1"/>
+              <a:t>q_minus_p_cross_r</a:t>
+            </a:r>
+            <a:r>
+              <a:rPr lang="en-US" dirty="0"/>
+              <a:t> / </a:t>
+            </a:r>
+            <a:r>
+              <a:rPr lang="en-US" dirty="0" err="1"/>
+              <a:t>r_cross_s</a:t>
+            </a:r>
+            <a:r>
+              <a:rPr lang="en-US" dirty="0"/>
+              <a:t> IN</a:t>
+            </a:r>
+          </a:p>
+          <a:p>
+            <a:pPr marL="0" indent="0">
+              <a:buFont typeface="Arial" panose="020B0604020202020204" pitchFamily="34" charset="0"/>
+              <a:buNone/>
+            </a:pPr>
+            <a:r>
+              <a:rPr lang="en-US" dirty="0"/>
+              <a:t>      IF ((0 &lt;= t AND t &lt;= 1) AND (0 &lt;= u AND u &lt;= 1)) THEN</a:t>
+            </a:r>
+          </a:p>
+          <a:p>
+            <a:pPr marL="0" indent="0">
+              <a:buFont typeface="Arial" panose="020B0604020202020204" pitchFamily="34" charset="0"/>
+              <a:buNone/>
+            </a:pPr>
+            <a:r>
+              <a:rPr lang="en-US" dirty="0"/>
+              <a:t>        (Intersecting, mk_vect2(</a:t>
+            </a:r>
+            <a:r>
+              <a:rPr lang="en-US" dirty="0" err="1"/>
+              <a:t>p`x</a:t>
+            </a:r>
+            <a:r>
+              <a:rPr lang="en-US" dirty="0"/>
+              <a:t> + t * </a:t>
+            </a:r>
+            <a:r>
+              <a:rPr lang="en-US" dirty="0" err="1"/>
+              <a:t>r`x</a:t>
+            </a:r>
+            <a:r>
+              <a:rPr lang="en-US" dirty="0"/>
+              <a:t>, </a:t>
+            </a:r>
+            <a:r>
+              <a:rPr lang="en-US" dirty="0" err="1"/>
+              <a:t>p`y</a:t>
+            </a:r>
+            <a:r>
+              <a:rPr lang="en-US" dirty="0"/>
+              <a:t> + t * </a:t>
+            </a:r>
+            <a:r>
+              <a:rPr lang="en-US" dirty="0" err="1"/>
+              <a:t>r`y</a:t>
+            </a:r>
+            <a:r>
+              <a:rPr lang="en-US" dirty="0"/>
+              <a:t>))</a:t>
+            </a:r>
+          </a:p>
+          <a:p>
+            <a:pPr marL="0" indent="0">
+              <a:buFont typeface="Arial" panose="020B0604020202020204" pitchFamily="34" charset="0"/>
+              <a:buNone/>
+            </a:pPr>
+            <a:r>
+              <a:rPr lang="en-US" dirty="0"/>
+              <a:t>      ELSE</a:t>
+            </a:r>
+          </a:p>
+          <a:p>
+            <a:pPr marL="0" indent="0">
+              <a:buFont typeface="Arial" panose="020B0604020202020204" pitchFamily="34" charset="0"/>
+              <a:buNone/>
+            </a:pPr>
+            <a:r>
+              <a:rPr lang="en-US" dirty="0"/>
+              <a:t>        (</a:t>
+            </a:r>
+            <a:r>
+              <a:rPr lang="en-US" dirty="0" err="1"/>
+              <a:t>Non_Parallel_Not_Intersecting</a:t>
+            </a:r>
+            <a:r>
+              <a:rPr lang="en-US" dirty="0"/>
+              <a:t>, </a:t>
+            </a:r>
+            <a:r>
+              <a:rPr lang="en-US" dirty="0" err="1"/>
+              <a:t>zero_point</a:t>
+            </a:r>
+            <a:r>
+              <a:rPr lang="en-US" dirty="0"/>
+              <a:t>)</a:t>
+            </a:r>
+          </a:p>
+          <a:p>
+            <a:pPr marL="0" indent="0">
+              <a:buFont typeface="Arial" panose="020B0604020202020204" pitchFamily="34" charset="0"/>
+              <a:buNone/>
+            </a:pPr>
+            <a:r>
+              <a:rPr lang="en-US" dirty="0"/>
+              <a:t>      ENDIF</a:t>
+            </a:r>
+          </a:p>
+          <a:p>
+            <a:pPr marL="0" indent="0">
+              <a:buFont typeface="Arial" panose="020B0604020202020204" pitchFamily="34" charset="0"/>
+              <a:buNone/>
+            </a:pPr>
+            <a:r>
+              <a:rPr lang="en-US" dirty="0"/>
+              <a:t>    ENDIF;</a:t>
+            </a:r>
+          </a:p>
+          <a:p>
+            <a:pPr marL="0" indent="0">
+              <a:buFont typeface="Arial" panose="020B0604020202020204" pitchFamily="34" charset="0"/>
+              <a:buNone/>
+            </a:pPr>
+            <a:endParaRPr lang="en-US" dirty="0"/>
           </a:p>
         </p:txBody>
       </p:sp>
     </p:spTree>
     <p:extLst>
       <p:ext uri="{BB962C8B-B14F-4D97-AF65-F5344CB8AC3E}">
-        <p14:creationId xmlns:p14="http://schemas.microsoft.com/office/powerpoint/2010/main" val="628979899"/>
+        <p14:creationId xmlns:p14="http://schemas.microsoft.com/office/powerpoint/2010/main" val="63529025"/>
       </p:ext>
     </p:extLst>
   </p:cSld>

</xml_diff>

<commit_message>
Tweak to title slide for bi-implication
</commit_message>
<xml_diff>
--- a/08_Bi_implication/Biimplication.pptx
+++ b/08_Bi_implication/Biimplication.pptx
@@ -3475,13 +3475,34 @@
           <a:lstStyle/>
           <a:p>
             <a:r>
-              <a:rPr lang="en-US" sz="6600" dirty="0">
+              <a:rPr lang="en-US" sz="6600" dirty="0" err="1">
                 <a:solidFill>
                   <a:schemeClr val="bg1"/>
                 </a:solidFill>
               </a:rPr>
-              <a:t>Bi-implication</a:t>
-            </a:r>
+              <a:t>Bi</a:t>
+            </a:r>
+            <a:r>
+              <a:rPr lang="en-US" sz="4000" dirty="0" err="1">
+                <a:solidFill>
+                  <a:schemeClr val="bg1"/>
+                </a:solidFill>
+              </a:rPr>
+              <a:t>↔</a:t>
+            </a:r>
+            <a:r>
+              <a:rPr lang="en-US" sz="6600" dirty="0" err="1">
+                <a:solidFill>
+                  <a:schemeClr val="bg1"/>
+                </a:solidFill>
+              </a:rPr>
+              <a:t>implication</a:t>
+            </a:r>
+            <a:endParaRPr lang="en-US" sz="6600" dirty="0">
+              <a:solidFill>
+                <a:schemeClr val="bg1"/>
+              </a:solidFill>
+            </a:endParaRPr>
           </a:p>
         </p:txBody>
       </p:sp>

</xml_diff>